<commit_message>
Front: Début de la mise en place du back-office front du user(artiste)
</commit_message>
<xml_diff>
--- a/support de presentation/presentation-projet-uniarts.pptx
+++ b/support de presentation/presentation-projet-uniarts.pptx
@@ -276,7 +276,7 @@
           <a:p>
             <a:fld id="{649A7FDB-7A9D-4885-9DB4-BA722628F860}" type="datetimeFigureOut">
               <a:rPr lang="fr-FR" smtClean="0"/>
-              <a:t>02/04/2020</a:t>
+              <a:t>10/04/2020</a:t>
             </a:fld>
             <a:endParaRPr lang="fr-FR"/>
           </a:p>
@@ -474,7 +474,7 @@
           <a:p>
             <a:fld id="{649A7FDB-7A9D-4885-9DB4-BA722628F860}" type="datetimeFigureOut">
               <a:rPr lang="fr-FR" smtClean="0"/>
-              <a:t>02/04/2020</a:t>
+              <a:t>10/04/2020</a:t>
             </a:fld>
             <a:endParaRPr lang="fr-FR"/>
           </a:p>
@@ -682,7 +682,7 @@
           <a:p>
             <a:fld id="{649A7FDB-7A9D-4885-9DB4-BA722628F860}" type="datetimeFigureOut">
               <a:rPr lang="fr-FR" smtClean="0"/>
-              <a:t>02/04/2020</a:t>
+              <a:t>10/04/2020</a:t>
             </a:fld>
             <a:endParaRPr lang="fr-FR"/>
           </a:p>
@@ -880,7 +880,7 @@
           <a:p>
             <a:fld id="{649A7FDB-7A9D-4885-9DB4-BA722628F860}" type="datetimeFigureOut">
               <a:rPr lang="fr-FR" smtClean="0"/>
-              <a:t>02/04/2020</a:t>
+              <a:t>10/04/2020</a:t>
             </a:fld>
             <a:endParaRPr lang="fr-FR"/>
           </a:p>
@@ -1155,7 +1155,7 @@
           <a:p>
             <a:fld id="{649A7FDB-7A9D-4885-9DB4-BA722628F860}" type="datetimeFigureOut">
               <a:rPr lang="fr-FR" smtClean="0"/>
-              <a:t>02/04/2020</a:t>
+              <a:t>10/04/2020</a:t>
             </a:fld>
             <a:endParaRPr lang="fr-FR"/>
           </a:p>
@@ -1420,7 +1420,7 @@
           <a:p>
             <a:fld id="{649A7FDB-7A9D-4885-9DB4-BA722628F860}" type="datetimeFigureOut">
               <a:rPr lang="fr-FR" smtClean="0"/>
-              <a:t>02/04/2020</a:t>
+              <a:t>10/04/2020</a:t>
             </a:fld>
             <a:endParaRPr lang="fr-FR"/>
           </a:p>
@@ -1832,7 +1832,7 @@
           <a:p>
             <a:fld id="{649A7FDB-7A9D-4885-9DB4-BA722628F860}" type="datetimeFigureOut">
               <a:rPr lang="fr-FR" smtClean="0"/>
-              <a:t>02/04/2020</a:t>
+              <a:t>10/04/2020</a:t>
             </a:fld>
             <a:endParaRPr lang="fr-FR"/>
           </a:p>
@@ -1973,7 +1973,7 @@
           <a:p>
             <a:fld id="{649A7FDB-7A9D-4885-9DB4-BA722628F860}" type="datetimeFigureOut">
               <a:rPr lang="fr-FR" smtClean="0"/>
-              <a:t>02/04/2020</a:t>
+              <a:t>10/04/2020</a:t>
             </a:fld>
             <a:endParaRPr lang="fr-FR"/>
           </a:p>
@@ -2086,7 +2086,7 @@
           <a:p>
             <a:fld id="{649A7FDB-7A9D-4885-9DB4-BA722628F860}" type="datetimeFigureOut">
               <a:rPr lang="fr-FR" smtClean="0"/>
-              <a:t>02/04/2020</a:t>
+              <a:t>10/04/2020</a:t>
             </a:fld>
             <a:endParaRPr lang="fr-FR"/>
           </a:p>
@@ -2397,7 +2397,7 @@
           <a:p>
             <a:fld id="{649A7FDB-7A9D-4885-9DB4-BA722628F860}" type="datetimeFigureOut">
               <a:rPr lang="fr-FR" smtClean="0"/>
-              <a:t>02/04/2020</a:t>
+              <a:t>10/04/2020</a:t>
             </a:fld>
             <a:endParaRPr lang="fr-FR"/>
           </a:p>
@@ -2685,7 +2685,7 @@
           <a:p>
             <a:fld id="{649A7FDB-7A9D-4885-9DB4-BA722628F860}" type="datetimeFigureOut">
               <a:rPr lang="fr-FR" smtClean="0"/>
-              <a:t>02/04/2020</a:t>
+              <a:t>10/04/2020</a:t>
             </a:fld>
             <a:endParaRPr lang="fr-FR"/>
           </a:p>
@@ -2926,7 +2926,7 @@
           <a:p>
             <a:fld id="{649A7FDB-7A9D-4885-9DB4-BA722628F860}" type="datetimeFigureOut">
               <a:rPr lang="fr-FR" smtClean="0"/>
-              <a:t>02/04/2020</a:t>
+              <a:t>10/04/2020</a:t>
             </a:fld>
             <a:endParaRPr lang="fr-FR"/>
           </a:p>

</xml_diff>